<commit_message>
broken branch. working on map builder
</commit_message>
<xml_diff>
--- a/plan/road gen plan.pptx
+++ b/plan/road gen plan.pptx
@@ -15,6 +15,7 @@
     <p:sldId id="263" r:id="rId9"/>
     <p:sldId id="264" r:id="rId10"/>
     <p:sldId id="265" r:id="rId11"/>
+    <p:sldId id="266" r:id="rId12"/>
   </p:sldIdLst>
   <p:sldSz cx="12192000" cy="6858000"/>
   <p:notesSz cx="6858000" cy="9144000"/>
@@ -268,7 +269,7 @@
           <a:p>
             <a:fld id="{D1B78991-D8FC-4616-A991-E51E17600797}" type="datetimeFigureOut">
               <a:rPr lang="en-US" smtClean="0"/>
-              <a:t>4/30/2021</a:t>
+              <a:t>5/4/2021</a:t>
             </a:fld>
             <a:endParaRPr lang="en-US"/>
           </a:p>
@@ -466,7 +467,7 @@
           <a:p>
             <a:fld id="{D1B78991-D8FC-4616-A991-E51E17600797}" type="datetimeFigureOut">
               <a:rPr lang="en-US" smtClean="0"/>
-              <a:t>4/30/2021</a:t>
+              <a:t>5/4/2021</a:t>
             </a:fld>
             <a:endParaRPr lang="en-US"/>
           </a:p>
@@ -674,7 +675,7 @@
           <a:p>
             <a:fld id="{D1B78991-D8FC-4616-A991-E51E17600797}" type="datetimeFigureOut">
               <a:rPr lang="en-US" smtClean="0"/>
-              <a:t>4/30/2021</a:t>
+              <a:t>5/4/2021</a:t>
             </a:fld>
             <a:endParaRPr lang="en-US"/>
           </a:p>
@@ -872,7 +873,7 @@
           <a:p>
             <a:fld id="{D1B78991-D8FC-4616-A991-E51E17600797}" type="datetimeFigureOut">
               <a:rPr lang="en-US" smtClean="0"/>
-              <a:t>4/30/2021</a:t>
+              <a:t>5/4/2021</a:t>
             </a:fld>
             <a:endParaRPr lang="en-US"/>
           </a:p>
@@ -1147,7 +1148,7 @@
           <a:p>
             <a:fld id="{D1B78991-D8FC-4616-A991-E51E17600797}" type="datetimeFigureOut">
               <a:rPr lang="en-US" smtClean="0"/>
-              <a:t>4/30/2021</a:t>
+              <a:t>5/4/2021</a:t>
             </a:fld>
             <a:endParaRPr lang="en-US"/>
           </a:p>
@@ -1412,7 +1413,7 @@
           <a:p>
             <a:fld id="{D1B78991-D8FC-4616-A991-E51E17600797}" type="datetimeFigureOut">
               <a:rPr lang="en-US" smtClean="0"/>
-              <a:t>4/30/2021</a:t>
+              <a:t>5/4/2021</a:t>
             </a:fld>
             <a:endParaRPr lang="en-US"/>
           </a:p>
@@ -1824,7 +1825,7 @@
           <a:p>
             <a:fld id="{D1B78991-D8FC-4616-A991-E51E17600797}" type="datetimeFigureOut">
               <a:rPr lang="en-US" smtClean="0"/>
-              <a:t>4/30/2021</a:t>
+              <a:t>5/4/2021</a:t>
             </a:fld>
             <a:endParaRPr lang="en-US"/>
           </a:p>
@@ -1965,7 +1966,7 @@
           <a:p>
             <a:fld id="{D1B78991-D8FC-4616-A991-E51E17600797}" type="datetimeFigureOut">
               <a:rPr lang="en-US" smtClean="0"/>
-              <a:t>4/30/2021</a:t>
+              <a:t>5/4/2021</a:t>
             </a:fld>
             <a:endParaRPr lang="en-US"/>
           </a:p>
@@ -2078,7 +2079,7 @@
           <a:p>
             <a:fld id="{D1B78991-D8FC-4616-A991-E51E17600797}" type="datetimeFigureOut">
               <a:rPr lang="en-US" smtClean="0"/>
-              <a:t>4/30/2021</a:t>
+              <a:t>5/4/2021</a:t>
             </a:fld>
             <a:endParaRPr lang="en-US"/>
           </a:p>
@@ -2389,7 +2390,7 @@
           <a:p>
             <a:fld id="{D1B78991-D8FC-4616-A991-E51E17600797}" type="datetimeFigureOut">
               <a:rPr lang="en-US" smtClean="0"/>
-              <a:t>4/30/2021</a:t>
+              <a:t>5/4/2021</a:t>
             </a:fld>
             <a:endParaRPr lang="en-US"/>
           </a:p>
@@ -2677,7 +2678,7 @@
           <a:p>
             <a:fld id="{D1B78991-D8FC-4616-A991-E51E17600797}" type="datetimeFigureOut">
               <a:rPr lang="en-US" smtClean="0"/>
-              <a:t>4/30/2021</a:t>
+              <a:t>5/4/2021</a:t>
             </a:fld>
             <a:endParaRPr lang="en-US"/>
           </a:p>
@@ -2918,7 +2919,7 @@
           <a:p>
             <a:fld id="{D1B78991-D8FC-4616-A991-E51E17600797}" type="datetimeFigureOut">
               <a:rPr lang="en-US" smtClean="0"/>
-              <a:t>4/30/2021</a:t>
+              <a:t>5/4/2021</a:t>
             </a:fld>
             <a:endParaRPr lang="en-US"/>
           </a:p>
@@ -6529,6 +6530,1020 @@
     <p:extLst>
       <p:ext uri="{BB962C8B-B14F-4D97-AF65-F5344CB8AC3E}">
         <p14:creationId xmlns:p14="http://schemas.microsoft.com/office/powerpoint/2010/main" val="3886587767"/>
+      </p:ext>
+    </p:extLst>
+  </p:cSld>
+  <p:clrMapOvr>
+    <a:masterClrMapping/>
+  </p:clrMapOvr>
+</p:sld>
+</file>
+
+<file path=ppt/slides/slide11.xml><?xml version="1.0" encoding="utf-8"?>
+<p:sld xmlns:a="http://schemas.openxmlformats.org/drawingml/2006/main" xmlns:r="http://schemas.openxmlformats.org/officeDocument/2006/relationships" xmlns:p="http://schemas.openxmlformats.org/presentationml/2006/main">
+  <p:cSld>
+    <p:spTree>
+      <p:nvGrpSpPr>
+        <p:cNvPr id="1" name=""/>
+        <p:cNvGrpSpPr/>
+        <p:nvPr/>
+      </p:nvGrpSpPr>
+      <p:grpSpPr>
+        <a:xfrm>
+          <a:off x="0" y="0"/>
+          <a:ext cx="0" cy="0"/>
+          <a:chOff x="0" y="0"/>
+          <a:chExt cx="0" cy="0"/>
+        </a:xfrm>
+      </p:grpSpPr>
+      <p:graphicFrame>
+        <p:nvGraphicFramePr>
+          <p:cNvPr id="8" name="Table 7">
+            <a:extLst>
+              <a:ext uri="{FF2B5EF4-FFF2-40B4-BE49-F238E27FC236}">
+                <a16:creationId xmlns:a16="http://schemas.microsoft.com/office/drawing/2014/main" id="{D8AE17EF-41F9-4FCA-A3E4-EBC9333B2E7D}"/>
+              </a:ext>
+            </a:extLst>
+          </p:cNvPr>
+          <p:cNvGraphicFramePr>
+            <a:graphicFrameLocks noGrp="1"/>
+          </p:cNvGraphicFramePr>
+          <p:nvPr>
+            <p:extLst>
+              <p:ext uri="{D42A27DB-BD31-4B8C-83A1-F6EECF244321}">
+                <p14:modId xmlns:p14="http://schemas.microsoft.com/office/powerpoint/2010/main" val="3910252228"/>
+              </p:ext>
+            </p:extLst>
+          </p:nvPr>
+        </p:nvGraphicFramePr>
+        <p:xfrm>
+          <a:off x="2032000" y="719665"/>
+          <a:ext cx="2897808" cy="4639516"/>
+        </p:xfrm>
+        <a:graphic>
+          <a:graphicData uri="http://schemas.openxmlformats.org/drawingml/2006/table">
+            <a:tbl>
+              <a:tblPr firstRow="1" bandRow="1">
+                <a:tableStyleId>{5C22544A-7EE6-4342-B048-85BDC9FD1C3A}</a:tableStyleId>
+              </a:tblPr>
+              <a:tblGrid>
+                <a:gridCol w="724452">
+                  <a:extLst>
+                    <a:ext uri="{9D8B030D-6E8A-4147-A177-3AD203B41FA5}">
+                      <a16:colId xmlns:a16="http://schemas.microsoft.com/office/drawing/2014/main" val="4247390610"/>
+                    </a:ext>
+                  </a:extLst>
+                </a:gridCol>
+                <a:gridCol w="724452">
+                  <a:extLst>
+                    <a:ext uri="{9D8B030D-6E8A-4147-A177-3AD203B41FA5}">
+                      <a16:colId xmlns:a16="http://schemas.microsoft.com/office/drawing/2014/main" val="2226899967"/>
+                    </a:ext>
+                  </a:extLst>
+                </a:gridCol>
+                <a:gridCol w="724452">
+                  <a:extLst>
+                    <a:ext uri="{9D8B030D-6E8A-4147-A177-3AD203B41FA5}">
+                      <a16:colId xmlns:a16="http://schemas.microsoft.com/office/drawing/2014/main" val="4292240374"/>
+                    </a:ext>
+                  </a:extLst>
+                </a:gridCol>
+                <a:gridCol w="724452">
+                  <a:extLst>
+                    <a:ext uri="{9D8B030D-6E8A-4147-A177-3AD203B41FA5}">
+                      <a16:colId xmlns:a16="http://schemas.microsoft.com/office/drawing/2014/main" val="3427784203"/>
+                    </a:ext>
+                  </a:extLst>
+                </a:gridCol>
+              </a:tblGrid>
+              <a:tr h="662788">
+                <a:tc>
+                  <a:txBody>
+                    <a:bodyPr/>
+                    <a:lstStyle/>
+                    <a:p>
+                      <a:endParaRPr lang="en-US" dirty="0"/>
+                    </a:p>
+                  </a:txBody>
+                  <a:tcPr/>
+                </a:tc>
+                <a:tc>
+                  <a:txBody>
+                    <a:bodyPr/>
+                    <a:lstStyle/>
+                    <a:p>
+                      <a:endParaRPr lang="en-US"/>
+                    </a:p>
+                  </a:txBody>
+                  <a:tcPr/>
+                </a:tc>
+                <a:tc>
+                  <a:txBody>
+                    <a:bodyPr/>
+                    <a:lstStyle/>
+                    <a:p>
+                      <a:endParaRPr lang="en-US"/>
+                    </a:p>
+                  </a:txBody>
+                  <a:tcPr/>
+                </a:tc>
+                <a:tc>
+                  <a:txBody>
+                    <a:bodyPr/>
+                    <a:lstStyle/>
+                    <a:p>
+                      <a:endParaRPr lang="en-US" dirty="0"/>
+                    </a:p>
+                  </a:txBody>
+                  <a:tcPr/>
+                </a:tc>
+                <a:extLst>
+                  <a:ext uri="{0D108BD9-81ED-4DB2-BD59-A6C34878D82A}">
+                    <a16:rowId xmlns:a16="http://schemas.microsoft.com/office/drawing/2014/main" val="3730544541"/>
+                  </a:ext>
+                </a:extLst>
+              </a:tr>
+              <a:tr h="662788">
+                <a:tc>
+                  <a:txBody>
+                    <a:bodyPr/>
+                    <a:lstStyle/>
+                    <a:p>
+                      <a:endParaRPr lang="en-US"/>
+                    </a:p>
+                  </a:txBody>
+                  <a:tcPr/>
+                </a:tc>
+                <a:tc>
+                  <a:txBody>
+                    <a:bodyPr/>
+                    <a:lstStyle/>
+                    <a:p>
+                      <a:endParaRPr lang="en-US" dirty="0"/>
+                    </a:p>
+                  </a:txBody>
+                  <a:tcPr/>
+                </a:tc>
+                <a:tc>
+                  <a:txBody>
+                    <a:bodyPr/>
+                    <a:lstStyle/>
+                    <a:p>
+                      <a:endParaRPr lang="en-US" dirty="0"/>
+                    </a:p>
+                  </a:txBody>
+                  <a:tcPr/>
+                </a:tc>
+                <a:tc>
+                  <a:txBody>
+                    <a:bodyPr/>
+                    <a:lstStyle/>
+                    <a:p>
+                      <a:endParaRPr lang="en-US" dirty="0"/>
+                    </a:p>
+                  </a:txBody>
+                  <a:tcPr/>
+                </a:tc>
+                <a:extLst>
+                  <a:ext uri="{0D108BD9-81ED-4DB2-BD59-A6C34878D82A}">
+                    <a16:rowId xmlns:a16="http://schemas.microsoft.com/office/drawing/2014/main" val="3575531507"/>
+                  </a:ext>
+                </a:extLst>
+              </a:tr>
+              <a:tr h="662788">
+                <a:tc>
+                  <a:txBody>
+                    <a:bodyPr/>
+                    <a:lstStyle/>
+                    <a:p>
+                      <a:endParaRPr lang="en-US"/>
+                    </a:p>
+                  </a:txBody>
+                  <a:tcPr/>
+                </a:tc>
+                <a:tc>
+                  <a:txBody>
+                    <a:bodyPr/>
+                    <a:lstStyle/>
+                    <a:p>
+                      <a:endParaRPr lang="en-US" dirty="0"/>
+                    </a:p>
+                  </a:txBody>
+                  <a:tcPr/>
+                </a:tc>
+                <a:tc>
+                  <a:txBody>
+                    <a:bodyPr/>
+                    <a:lstStyle/>
+                    <a:p>
+                      <a:endParaRPr lang="en-US" dirty="0"/>
+                    </a:p>
+                  </a:txBody>
+                  <a:tcPr/>
+                </a:tc>
+                <a:tc>
+                  <a:txBody>
+                    <a:bodyPr/>
+                    <a:lstStyle/>
+                    <a:p>
+                      <a:endParaRPr lang="en-US" dirty="0"/>
+                    </a:p>
+                  </a:txBody>
+                  <a:tcPr/>
+                </a:tc>
+                <a:extLst>
+                  <a:ext uri="{0D108BD9-81ED-4DB2-BD59-A6C34878D82A}">
+                    <a16:rowId xmlns:a16="http://schemas.microsoft.com/office/drawing/2014/main" val="496976955"/>
+                  </a:ext>
+                </a:extLst>
+              </a:tr>
+              <a:tr h="662788">
+                <a:tc>
+                  <a:txBody>
+                    <a:bodyPr/>
+                    <a:lstStyle/>
+                    <a:p>
+                      <a:endParaRPr lang="en-US"/>
+                    </a:p>
+                  </a:txBody>
+                  <a:tcPr/>
+                </a:tc>
+                <a:tc>
+                  <a:txBody>
+                    <a:bodyPr/>
+                    <a:lstStyle/>
+                    <a:p>
+                      <a:endParaRPr lang="en-US" dirty="0"/>
+                    </a:p>
+                  </a:txBody>
+                  <a:tcPr/>
+                </a:tc>
+                <a:tc>
+                  <a:txBody>
+                    <a:bodyPr/>
+                    <a:lstStyle/>
+                    <a:p>
+                      <a:endParaRPr lang="en-US" dirty="0"/>
+                    </a:p>
+                  </a:txBody>
+                  <a:tcPr/>
+                </a:tc>
+                <a:tc>
+                  <a:txBody>
+                    <a:bodyPr/>
+                    <a:lstStyle/>
+                    <a:p>
+                      <a:endParaRPr lang="en-US" dirty="0"/>
+                    </a:p>
+                  </a:txBody>
+                  <a:tcPr/>
+                </a:tc>
+                <a:extLst>
+                  <a:ext uri="{0D108BD9-81ED-4DB2-BD59-A6C34878D82A}">
+                    <a16:rowId xmlns:a16="http://schemas.microsoft.com/office/drawing/2014/main" val="2032670056"/>
+                  </a:ext>
+                </a:extLst>
+              </a:tr>
+              <a:tr h="662788">
+                <a:tc>
+                  <a:txBody>
+                    <a:bodyPr/>
+                    <a:lstStyle/>
+                    <a:p>
+                      <a:endParaRPr lang="en-US"/>
+                    </a:p>
+                  </a:txBody>
+                  <a:tcPr/>
+                </a:tc>
+                <a:tc>
+                  <a:txBody>
+                    <a:bodyPr/>
+                    <a:lstStyle/>
+                    <a:p>
+                      <a:endParaRPr lang="en-US" dirty="0"/>
+                    </a:p>
+                  </a:txBody>
+                  <a:tcPr/>
+                </a:tc>
+                <a:tc>
+                  <a:txBody>
+                    <a:bodyPr/>
+                    <a:lstStyle/>
+                    <a:p>
+                      <a:endParaRPr lang="en-US" dirty="0"/>
+                    </a:p>
+                  </a:txBody>
+                  <a:tcPr/>
+                </a:tc>
+                <a:tc>
+                  <a:txBody>
+                    <a:bodyPr/>
+                    <a:lstStyle/>
+                    <a:p>
+                      <a:endParaRPr lang="en-US" dirty="0"/>
+                    </a:p>
+                  </a:txBody>
+                  <a:tcPr/>
+                </a:tc>
+                <a:extLst>
+                  <a:ext uri="{0D108BD9-81ED-4DB2-BD59-A6C34878D82A}">
+                    <a16:rowId xmlns:a16="http://schemas.microsoft.com/office/drawing/2014/main" val="79082920"/>
+                  </a:ext>
+                </a:extLst>
+              </a:tr>
+              <a:tr h="662788">
+                <a:tc>
+                  <a:txBody>
+                    <a:bodyPr/>
+                    <a:lstStyle/>
+                    <a:p>
+                      <a:endParaRPr lang="en-US"/>
+                    </a:p>
+                  </a:txBody>
+                  <a:tcPr/>
+                </a:tc>
+                <a:tc>
+                  <a:txBody>
+                    <a:bodyPr/>
+                    <a:lstStyle/>
+                    <a:p>
+                      <a:endParaRPr lang="en-US" dirty="0"/>
+                    </a:p>
+                  </a:txBody>
+                  <a:tcPr/>
+                </a:tc>
+                <a:tc>
+                  <a:txBody>
+                    <a:bodyPr/>
+                    <a:lstStyle/>
+                    <a:p>
+                      <a:endParaRPr lang="en-US"/>
+                    </a:p>
+                  </a:txBody>
+                  <a:tcPr/>
+                </a:tc>
+                <a:tc>
+                  <a:txBody>
+                    <a:bodyPr/>
+                    <a:lstStyle/>
+                    <a:p>
+                      <a:endParaRPr lang="en-US"/>
+                    </a:p>
+                  </a:txBody>
+                  <a:tcPr/>
+                </a:tc>
+                <a:extLst>
+                  <a:ext uri="{0D108BD9-81ED-4DB2-BD59-A6C34878D82A}">
+                    <a16:rowId xmlns:a16="http://schemas.microsoft.com/office/drawing/2014/main" val="98530200"/>
+                  </a:ext>
+                </a:extLst>
+              </a:tr>
+              <a:tr h="662788">
+                <a:tc>
+                  <a:txBody>
+                    <a:bodyPr/>
+                    <a:lstStyle/>
+                    <a:p>
+                      <a:endParaRPr lang="en-US" dirty="0"/>
+                    </a:p>
+                  </a:txBody>
+                  <a:tcPr/>
+                </a:tc>
+                <a:tc>
+                  <a:txBody>
+                    <a:bodyPr/>
+                    <a:lstStyle/>
+                    <a:p>
+                      <a:endParaRPr lang="en-US"/>
+                    </a:p>
+                  </a:txBody>
+                  <a:tcPr/>
+                </a:tc>
+                <a:tc>
+                  <a:txBody>
+                    <a:bodyPr/>
+                    <a:lstStyle/>
+                    <a:p>
+                      <a:endParaRPr lang="en-US"/>
+                    </a:p>
+                  </a:txBody>
+                  <a:tcPr/>
+                </a:tc>
+                <a:tc>
+                  <a:txBody>
+                    <a:bodyPr/>
+                    <a:lstStyle/>
+                    <a:p>
+                      <a:endParaRPr lang="en-US" dirty="0"/>
+                    </a:p>
+                  </a:txBody>
+                  <a:tcPr/>
+                </a:tc>
+                <a:extLst>
+                  <a:ext uri="{0D108BD9-81ED-4DB2-BD59-A6C34878D82A}">
+                    <a16:rowId xmlns:a16="http://schemas.microsoft.com/office/drawing/2014/main" val="1439673941"/>
+                  </a:ext>
+                </a:extLst>
+              </a:tr>
+            </a:tbl>
+          </a:graphicData>
+        </a:graphic>
+      </p:graphicFrame>
+      <p:grpSp>
+        <p:nvGrpSpPr>
+          <p:cNvPr id="9" name="Group 8">
+            <a:extLst>
+              <a:ext uri="{FF2B5EF4-FFF2-40B4-BE49-F238E27FC236}">
+                <a16:creationId xmlns:a16="http://schemas.microsoft.com/office/drawing/2014/main" id="{24AD59A8-0584-4B1F-8E05-70535FC15141}"/>
+              </a:ext>
+            </a:extLst>
+          </p:cNvPr>
+          <p:cNvGrpSpPr/>
+          <p:nvPr/>
+        </p:nvGrpSpPr>
+        <p:grpSpPr>
+          <a:xfrm>
+            <a:off x="3647459" y="2811029"/>
+            <a:ext cx="449249" cy="449249"/>
+            <a:chOff x="480613" y="985962"/>
+            <a:chExt cx="1241283" cy="1241283"/>
+          </a:xfrm>
+        </p:grpSpPr>
+        <p:sp>
+          <p:nvSpPr>
+            <p:cNvPr id="10" name="Rectangle 9">
+              <a:extLst>
+                <a:ext uri="{FF2B5EF4-FFF2-40B4-BE49-F238E27FC236}">
+                  <a16:creationId xmlns:a16="http://schemas.microsoft.com/office/drawing/2014/main" id="{FBB28F1E-A125-444C-BC2E-AC3D458C454E}"/>
+                </a:ext>
+              </a:extLst>
+            </p:cNvPr>
+            <p:cNvSpPr/>
+            <p:nvPr/>
+          </p:nvSpPr>
+          <p:spPr>
+            <a:xfrm>
+              <a:off x="989937" y="985962"/>
+              <a:ext cx="222637" cy="1241283"/>
+            </a:xfrm>
+            <a:prstGeom prst="rect">
+              <a:avLst/>
+            </a:prstGeom>
+          </p:spPr>
+          <p:style>
+            <a:lnRef idx="2">
+              <a:schemeClr val="accent1">
+                <a:shade val="50000"/>
+              </a:schemeClr>
+            </a:lnRef>
+            <a:fillRef idx="1">
+              <a:schemeClr val="accent1"/>
+            </a:fillRef>
+            <a:effectRef idx="0">
+              <a:schemeClr val="accent1"/>
+            </a:effectRef>
+            <a:fontRef idx="minor">
+              <a:schemeClr val="lt1"/>
+            </a:fontRef>
+          </p:style>
+          <p:txBody>
+            <a:bodyPr rtlCol="0" anchor="ctr"/>
+            <a:lstStyle/>
+            <a:p>
+              <a:pPr algn="ctr"/>
+              <a:endParaRPr lang="en-US"/>
+            </a:p>
+          </p:txBody>
+        </p:sp>
+        <p:sp>
+          <p:nvSpPr>
+            <p:cNvPr id="11" name="Rectangle 10">
+              <a:extLst>
+                <a:ext uri="{FF2B5EF4-FFF2-40B4-BE49-F238E27FC236}">
+                  <a16:creationId xmlns:a16="http://schemas.microsoft.com/office/drawing/2014/main" id="{6CE62AA6-4D25-4DC9-914C-53A245CB01C4}"/>
+                </a:ext>
+              </a:extLst>
+            </p:cNvPr>
+            <p:cNvSpPr/>
+            <p:nvPr/>
+          </p:nvSpPr>
+          <p:spPr>
+            <a:xfrm rot="5400000">
+              <a:off x="989936" y="950181"/>
+              <a:ext cx="222637" cy="1241283"/>
+            </a:xfrm>
+            <a:prstGeom prst="rect">
+              <a:avLst/>
+            </a:prstGeom>
+          </p:spPr>
+          <p:style>
+            <a:lnRef idx="2">
+              <a:schemeClr val="accent1">
+                <a:shade val="50000"/>
+              </a:schemeClr>
+            </a:lnRef>
+            <a:fillRef idx="1">
+              <a:schemeClr val="accent1"/>
+            </a:fillRef>
+            <a:effectRef idx="0">
+              <a:schemeClr val="accent1"/>
+            </a:effectRef>
+            <a:fontRef idx="minor">
+              <a:schemeClr val="lt1"/>
+            </a:fontRef>
+          </p:style>
+          <p:txBody>
+            <a:bodyPr rtlCol="0" anchor="ctr"/>
+            <a:lstStyle/>
+            <a:p>
+              <a:pPr algn="ctr"/>
+              <a:endParaRPr lang="en-US"/>
+            </a:p>
+          </p:txBody>
+        </p:sp>
+      </p:grpSp>
+      <p:grpSp>
+        <p:nvGrpSpPr>
+          <p:cNvPr id="12" name="Group 11">
+            <a:extLst>
+              <a:ext uri="{FF2B5EF4-FFF2-40B4-BE49-F238E27FC236}">
+                <a16:creationId xmlns:a16="http://schemas.microsoft.com/office/drawing/2014/main" id="{702113C8-45F6-45B3-9F3A-5BDC6B3F3EEC}"/>
+              </a:ext>
+            </a:extLst>
+          </p:cNvPr>
+          <p:cNvGrpSpPr/>
+          <p:nvPr/>
+        </p:nvGrpSpPr>
+        <p:grpSpPr>
+          <a:xfrm>
+            <a:off x="2180774" y="2827005"/>
+            <a:ext cx="449249" cy="449249"/>
+            <a:chOff x="480613" y="985962"/>
+            <a:chExt cx="1241283" cy="1241283"/>
+          </a:xfrm>
+        </p:grpSpPr>
+        <p:sp>
+          <p:nvSpPr>
+            <p:cNvPr id="13" name="Rectangle 12">
+              <a:extLst>
+                <a:ext uri="{FF2B5EF4-FFF2-40B4-BE49-F238E27FC236}">
+                  <a16:creationId xmlns:a16="http://schemas.microsoft.com/office/drawing/2014/main" id="{16716914-008D-4E4D-A677-403E43F56DF8}"/>
+                </a:ext>
+              </a:extLst>
+            </p:cNvPr>
+            <p:cNvSpPr/>
+            <p:nvPr/>
+          </p:nvSpPr>
+          <p:spPr>
+            <a:xfrm>
+              <a:off x="989937" y="985962"/>
+              <a:ext cx="222637" cy="1241283"/>
+            </a:xfrm>
+            <a:prstGeom prst="rect">
+              <a:avLst/>
+            </a:prstGeom>
+          </p:spPr>
+          <p:style>
+            <a:lnRef idx="2">
+              <a:schemeClr val="accent1">
+                <a:shade val="50000"/>
+              </a:schemeClr>
+            </a:lnRef>
+            <a:fillRef idx="1">
+              <a:schemeClr val="accent1"/>
+            </a:fillRef>
+            <a:effectRef idx="0">
+              <a:schemeClr val="accent1"/>
+            </a:effectRef>
+            <a:fontRef idx="minor">
+              <a:schemeClr val="lt1"/>
+            </a:fontRef>
+          </p:style>
+          <p:txBody>
+            <a:bodyPr rtlCol="0" anchor="ctr"/>
+            <a:lstStyle/>
+            <a:p>
+              <a:pPr algn="ctr"/>
+              <a:endParaRPr lang="en-US"/>
+            </a:p>
+          </p:txBody>
+        </p:sp>
+        <p:sp>
+          <p:nvSpPr>
+            <p:cNvPr id="14" name="Rectangle 13">
+              <a:extLst>
+                <a:ext uri="{FF2B5EF4-FFF2-40B4-BE49-F238E27FC236}">
+                  <a16:creationId xmlns:a16="http://schemas.microsoft.com/office/drawing/2014/main" id="{B2B7DE7F-DCD3-44A0-8AAD-86DFBB338D40}"/>
+                </a:ext>
+              </a:extLst>
+            </p:cNvPr>
+            <p:cNvSpPr/>
+            <p:nvPr/>
+          </p:nvSpPr>
+          <p:spPr>
+            <a:xfrm rot="5400000">
+              <a:off x="989936" y="950181"/>
+              <a:ext cx="222637" cy="1241283"/>
+            </a:xfrm>
+            <a:prstGeom prst="rect">
+              <a:avLst/>
+            </a:prstGeom>
+          </p:spPr>
+          <p:style>
+            <a:lnRef idx="2">
+              <a:schemeClr val="accent1">
+                <a:shade val="50000"/>
+              </a:schemeClr>
+            </a:lnRef>
+            <a:fillRef idx="1">
+              <a:schemeClr val="accent1"/>
+            </a:fillRef>
+            <a:effectRef idx="0">
+              <a:schemeClr val="accent1"/>
+            </a:effectRef>
+            <a:fontRef idx="minor">
+              <a:schemeClr val="lt1"/>
+            </a:fontRef>
+          </p:style>
+          <p:txBody>
+            <a:bodyPr rtlCol="0" anchor="ctr"/>
+            <a:lstStyle/>
+            <a:p>
+              <a:pPr algn="ctr"/>
+              <a:endParaRPr lang="en-US"/>
+            </a:p>
+          </p:txBody>
+        </p:sp>
+      </p:grpSp>
+      <p:grpSp>
+        <p:nvGrpSpPr>
+          <p:cNvPr id="15" name="Group 14">
+            <a:extLst>
+              <a:ext uri="{FF2B5EF4-FFF2-40B4-BE49-F238E27FC236}">
+                <a16:creationId xmlns:a16="http://schemas.microsoft.com/office/drawing/2014/main" id="{ED36C3C0-E09C-4436-8273-A3F00EECE88B}"/>
+              </a:ext>
+            </a:extLst>
+          </p:cNvPr>
+          <p:cNvGrpSpPr/>
+          <p:nvPr/>
+        </p:nvGrpSpPr>
+        <p:grpSpPr>
+          <a:xfrm>
+            <a:off x="2875189" y="2823980"/>
+            <a:ext cx="449249" cy="449249"/>
+            <a:chOff x="480613" y="985962"/>
+            <a:chExt cx="1241283" cy="1241283"/>
+          </a:xfrm>
+        </p:grpSpPr>
+        <p:sp>
+          <p:nvSpPr>
+            <p:cNvPr id="16" name="Rectangle 15">
+              <a:extLst>
+                <a:ext uri="{FF2B5EF4-FFF2-40B4-BE49-F238E27FC236}">
+                  <a16:creationId xmlns:a16="http://schemas.microsoft.com/office/drawing/2014/main" id="{EE47EA28-8459-4698-BC39-8CED9CF3B255}"/>
+                </a:ext>
+              </a:extLst>
+            </p:cNvPr>
+            <p:cNvSpPr/>
+            <p:nvPr/>
+          </p:nvSpPr>
+          <p:spPr>
+            <a:xfrm>
+              <a:off x="989937" y="985962"/>
+              <a:ext cx="222637" cy="1241283"/>
+            </a:xfrm>
+            <a:prstGeom prst="rect">
+              <a:avLst/>
+            </a:prstGeom>
+          </p:spPr>
+          <p:style>
+            <a:lnRef idx="2">
+              <a:schemeClr val="accent1">
+                <a:shade val="50000"/>
+              </a:schemeClr>
+            </a:lnRef>
+            <a:fillRef idx="1">
+              <a:schemeClr val="accent1"/>
+            </a:fillRef>
+            <a:effectRef idx="0">
+              <a:schemeClr val="accent1"/>
+            </a:effectRef>
+            <a:fontRef idx="minor">
+              <a:schemeClr val="lt1"/>
+            </a:fontRef>
+          </p:style>
+          <p:txBody>
+            <a:bodyPr rtlCol="0" anchor="ctr"/>
+            <a:lstStyle/>
+            <a:p>
+              <a:pPr algn="ctr"/>
+              <a:endParaRPr lang="en-US"/>
+            </a:p>
+          </p:txBody>
+        </p:sp>
+        <p:sp>
+          <p:nvSpPr>
+            <p:cNvPr id="17" name="Rectangle 16">
+              <a:extLst>
+                <a:ext uri="{FF2B5EF4-FFF2-40B4-BE49-F238E27FC236}">
+                  <a16:creationId xmlns:a16="http://schemas.microsoft.com/office/drawing/2014/main" id="{9EA24543-0B57-4D7D-BFD7-325EE6516E85}"/>
+                </a:ext>
+              </a:extLst>
+            </p:cNvPr>
+            <p:cNvSpPr/>
+            <p:nvPr/>
+          </p:nvSpPr>
+          <p:spPr>
+            <a:xfrm rot="5400000">
+              <a:off x="989936" y="950181"/>
+              <a:ext cx="222637" cy="1241283"/>
+            </a:xfrm>
+            <a:prstGeom prst="rect">
+              <a:avLst/>
+            </a:prstGeom>
+          </p:spPr>
+          <p:style>
+            <a:lnRef idx="2">
+              <a:schemeClr val="accent1">
+                <a:shade val="50000"/>
+              </a:schemeClr>
+            </a:lnRef>
+            <a:fillRef idx="1">
+              <a:schemeClr val="accent1"/>
+            </a:fillRef>
+            <a:effectRef idx="0">
+              <a:schemeClr val="accent1"/>
+            </a:effectRef>
+            <a:fontRef idx="minor">
+              <a:schemeClr val="lt1"/>
+            </a:fontRef>
+          </p:style>
+          <p:txBody>
+            <a:bodyPr rtlCol="0" anchor="ctr"/>
+            <a:lstStyle/>
+            <a:p>
+              <a:pPr algn="ctr"/>
+              <a:endParaRPr lang="en-US"/>
+            </a:p>
+          </p:txBody>
+        </p:sp>
+      </p:grpSp>
+      <p:grpSp>
+        <p:nvGrpSpPr>
+          <p:cNvPr id="18" name="Group 17">
+            <a:extLst>
+              <a:ext uri="{FF2B5EF4-FFF2-40B4-BE49-F238E27FC236}">
+                <a16:creationId xmlns:a16="http://schemas.microsoft.com/office/drawing/2014/main" id="{D5F6BAB4-9CD3-4B0B-93B7-FE87E4E334F9}"/>
+              </a:ext>
+            </a:extLst>
+          </p:cNvPr>
+          <p:cNvGrpSpPr/>
+          <p:nvPr/>
+        </p:nvGrpSpPr>
+        <p:grpSpPr>
+          <a:xfrm>
+            <a:off x="2875188" y="2132591"/>
+            <a:ext cx="449249" cy="449249"/>
+            <a:chOff x="480613" y="985962"/>
+            <a:chExt cx="1241283" cy="1241283"/>
+          </a:xfrm>
+        </p:grpSpPr>
+        <p:sp>
+          <p:nvSpPr>
+            <p:cNvPr id="19" name="Rectangle 18">
+              <a:extLst>
+                <a:ext uri="{FF2B5EF4-FFF2-40B4-BE49-F238E27FC236}">
+                  <a16:creationId xmlns:a16="http://schemas.microsoft.com/office/drawing/2014/main" id="{D635F2DA-A80F-4D7A-8FD7-65D79D9B6229}"/>
+                </a:ext>
+              </a:extLst>
+            </p:cNvPr>
+            <p:cNvSpPr/>
+            <p:nvPr/>
+          </p:nvSpPr>
+          <p:spPr>
+            <a:xfrm>
+              <a:off x="989937" y="985962"/>
+              <a:ext cx="222637" cy="1241283"/>
+            </a:xfrm>
+            <a:prstGeom prst="rect">
+              <a:avLst/>
+            </a:prstGeom>
+          </p:spPr>
+          <p:style>
+            <a:lnRef idx="2">
+              <a:schemeClr val="accent1">
+                <a:shade val="50000"/>
+              </a:schemeClr>
+            </a:lnRef>
+            <a:fillRef idx="1">
+              <a:schemeClr val="accent1"/>
+            </a:fillRef>
+            <a:effectRef idx="0">
+              <a:schemeClr val="accent1"/>
+            </a:effectRef>
+            <a:fontRef idx="minor">
+              <a:schemeClr val="lt1"/>
+            </a:fontRef>
+          </p:style>
+          <p:txBody>
+            <a:bodyPr rtlCol="0" anchor="ctr"/>
+            <a:lstStyle/>
+            <a:p>
+              <a:pPr algn="ctr"/>
+              <a:endParaRPr lang="en-US"/>
+            </a:p>
+          </p:txBody>
+        </p:sp>
+        <p:sp>
+          <p:nvSpPr>
+            <p:cNvPr id="20" name="Rectangle 19">
+              <a:extLst>
+                <a:ext uri="{FF2B5EF4-FFF2-40B4-BE49-F238E27FC236}">
+                  <a16:creationId xmlns:a16="http://schemas.microsoft.com/office/drawing/2014/main" id="{9D25F5D7-E4F2-4F77-AC66-5F5DBAF9458F}"/>
+                </a:ext>
+              </a:extLst>
+            </p:cNvPr>
+            <p:cNvSpPr/>
+            <p:nvPr/>
+          </p:nvSpPr>
+          <p:spPr>
+            <a:xfrm rot="5400000">
+              <a:off x="989936" y="950181"/>
+              <a:ext cx="222637" cy="1241283"/>
+            </a:xfrm>
+            <a:prstGeom prst="rect">
+              <a:avLst/>
+            </a:prstGeom>
+          </p:spPr>
+          <p:style>
+            <a:lnRef idx="2">
+              <a:schemeClr val="accent1">
+                <a:shade val="50000"/>
+              </a:schemeClr>
+            </a:lnRef>
+            <a:fillRef idx="1">
+              <a:schemeClr val="accent1"/>
+            </a:fillRef>
+            <a:effectRef idx="0">
+              <a:schemeClr val="accent1"/>
+            </a:effectRef>
+            <a:fontRef idx="minor">
+              <a:schemeClr val="lt1"/>
+            </a:fontRef>
+          </p:style>
+          <p:txBody>
+            <a:bodyPr rtlCol="0" anchor="ctr"/>
+            <a:lstStyle/>
+            <a:p>
+              <a:pPr algn="ctr"/>
+              <a:endParaRPr lang="en-US"/>
+            </a:p>
+          </p:txBody>
+        </p:sp>
+      </p:grpSp>
+      <p:cxnSp>
+        <p:nvCxnSpPr>
+          <p:cNvPr id="26" name="Straight Connector 25">
+            <a:extLst>
+              <a:ext uri="{FF2B5EF4-FFF2-40B4-BE49-F238E27FC236}">
+                <a16:creationId xmlns:a16="http://schemas.microsoft.com/office/drawing/2014/main" id="{BA421ED8-895A-4204-B97C-E1DB845D8A48}"/>
+              </a:ext>
+            </a:extLst>
+          </p:cNvPr>
+          <p:cNvCxnSpPr/>
+          <p:nvPr/>
+        </p:nvCxnSpPr>
+        <p:spPr>
+          <a:xfrm flipV="1">
+            <a:off x="5957332" y="1057524"/>
+            <a:ext cx="2389367" cy="2407257"/>
+          </a:xfrm>
+          <a:prstGeom prst="line">
+            <a:avLst/>
+          </a:prstGeom>
+        </p:spPr>
+        <p:style>
+          <a:lnRef idx="1">
+            <a:schemeClr val="accent1"/>
+          </a:lnRef>
+          <a:fillRef idx="0">
+            <a:schemeClr val="accent1"/>
+          </a:fillRef>
+          <a:effectRef idx="0">
+            <a:schemeClr val="accent1"/>
+          </a:effectRef>
+          <a:fontRef idx="minor">
+            <a:schemeClr val="tx1"/>
+          </a:fontRef>
+        </p:style>
+      </p:cxnSp>
+      <p:sp>
+        <p:nvSpPr>
+          <p:cNvPr id="27" name="Rectangle 26">
+            <a:extLst>
+              <a:ext uri="{FF2B5EF4-FFF2-40B4-BE49-F238E27FC236}">
+                <a16:creationId xmlns:a16="http://schemas.microsoft.com/office/drawing/2014/main" id="{227C1E72-9D72-4297-AFCB-9DA9DF30C8E4}"/>
+              </a:ext>
+            </a:extLst>
+          </p:cNvPr>
+          <p:cNvSpPr/>
+          <p:nvPr/>
+        </p:nvSpPr>
+        <p:spPr>
+          <a:xfrm>
+            <a:off x="6315916" y="2445268"/>
+            <a:ext cx="4870174" cy="1180769"/>
+          </a:xfrm>
+          <a:prstGeom prst="rect">
+            <a:avLst/>
+          </a:prstGeom>
+        </p:spPr>
+        <p:style>
+          <a:lnRef idx="2">
+            <a:schemeClr val="accent1">
+              <a:shade val="50000"/>
+            </a:schemeClr>
+          </a:lnRef>
+          <a:fillRef idx="1">
+            <a:schemeClr val="accent1"/>
+          </a:fillRef>
+          <a:effectRef idx="0">
+            <a:schemeClr val="accent1"/>
+          </a:effectRef>
+          <a:fontRef idx="minor">
+            <a:schemeClr val="lt1"/>
+          </a:fontRef>
+        </p:style>
+        <p:txBody>
+          <a:bodyPr rtlCol="0" anchor="ctr"/>
+          <a:lstStyle/>
+          <a:p>
+            <a:pPr algn="ctr"/>
+            <a:r>
+              <a:rPr lang="en-US" dirty="0"/>
+              <a:t>Logical quadrants for incident roads. </a:t>
+            </a:r>
+          </a:p>
+        </p:txBody>
+      </p:sp>
+      <p:sp>
+        <p:nvSpPr>
+          <p:cNvPr id="28" name="Rectangle 27">
+            <a:extLst>
+              <a:ext uri="{FF2B5EF4-FFF2-40B4-BE49-F238E27FC236}">
+                <a16:creationId xmlns:a16="http://schemas.microsoft.com/office/drawing/2014/main" id="{249A8294-F098-491C-A9FA-045AB69712CE}"/>
+              </a:ext>
+            </a:extLst>
+          </p:cNvPr>
+          <p:cNvSpPr/>
+          <p:nvPr/>
+        </p:nvSpPr>
+        <p:spPr>
+          <a:xfrm>
+            <a:off x="6315916" y="4178412"/>
+            <a:ext cx="4870174" cy="1180769"/>
+          </a:xfrm>
+          <a:prstGeom prst="rect">
+            <a:avLst/>
+          </a:prstGeom>
+        </p:spPr>
+        <p:style>
+          <a:lnRef idx="2">
+            <a:schemeClr val="accent1">
+              <a:shade val="50000"/>
+            </a:schemeClr>
+          </a:lnRef>
+          <a:fillRef idx="1">
+            <a:schemeClr val="accent1"/>
+          </a:fillRef>
+          <a:effectRef idx="0">
+            <a:schemeClr val="accent1"/>
+          </a:effectRef>
+          <a:fontRef idx="minor">
+            <a:schemeClr val="lt1"/>
+          </a:fontRef>
+        </p:style>
+        <p:txBody>
+          <a:bodyPr rtlCol="0" anchor="ctr"/>
+          <a:lstStyle/>
+          <a:p>
+            <a:pPr algn="ctr"/>
+            <a:r>
+              <a:rPr lang="en-US" dirty="0"/>
+              <a:t>Should we keep the rotation as a constraint problem? We can allow an intersection to be rotated to fit into </a:t>
+            </a:r>
+            <a:r>
+              <a:rPr lang="en-US"/>
+              <a:t>a cell.</a:t>
+            </a:r>
+            <a:endParaRPr lang="en-US" dirty="0"/>
+          </a:p>
+        </p:txBody>
+      </p:sp>
+    </p:spTree>
+    <p:extLst>
+      <p:ext uri="{BB962C8B-B14F-4D97-AF65-F5344CB8AC3E}">
+        <p14:creationId xmlns:p14="http://schemas.microsoft.com/office/powerpoint/2010/main" val="3246010809"/>
       </p:ext>
     </p:extLst>
   </p:cSld>
@@ -13917,7 +14932,7 @@
         </p:nvGrpSpPr>
         <p:grpSpPr>
           <a:xfrm>
-            <a:off x="1456744" y="2018490"/>
+            <a:off x="802826" y="1958246"/>
             <a:ext cx="508362" cy="508362"/>
             <a:chOff x="480613" y="985962"/>
             <a:chExt cx="1241283" cy="1241283"/>
@@ -14033,9 +15048,9 @@
           <p:nvPr/>
         </p:nvCxnSpPr>
         <p:spPr>
-          <a:xfrm flipH="1">
-            <a:off x="1965106" y="2251160"/>
-            <a:ext cx="797914" cy="6857"/>
+          <a:xfrm flipH="1" flipV="1">
+            <a:off x="1311188" y="2197773"/>
+            <a:ext cx="1451832" cy="53387"/>
           </a:xfrm>
           <a:prstGeom prst="line">
             <a:avLst/>
@@ -15627,13 +16642,8 @@
             </a:pPr>
             <a:r>
               <a:rPr lang="en-US" dirty="0"/>
-              <a:t>Or just boxes for a layout. Then place intersections, rotate and try to connect to closest intersection without overlaps. But that’s </a:t>
+              <a:t>Or just boxes for a layout. Then place intersections, rotate and try to connect to closest intersection without overlaps. But that’s another constraint</a:t>
             </a:r>
-            <a:r>
-              <a:rPr lang="en-US"/>
-              <a:t>another constraint</a:t>
-            </a:r>
-            <a:endParaRPr lang="en-US" dirty="0"/>
           </a:p>
         </p:txBody>
       </p:sp>

</xml_diff>

<commit_message>
working on control lines
</commit_message>
<xml_diff>
--- a/plan/road gen plan.pptx
+++ b/plan/road gen plan.pptx
@@ -283,7 +283,7 @@
           <a:p>
             <a:fld id="{D1B78991-D8FC-4616-A991-E51E17600797}" type="datetimeFigureOut">
               <a:rPr lang="en-US" smtClean="0"/>
-              <a:t>6/1/2021</a:t>
+              <a:t>6/2/2021</a:t>
             </a:fld>
             <a:endParaRPr lang="en-US"/>
           </a:p>
@@ -481,7 +481,7 @@
           <a:p>
             <a:fld id="{D1B78991-D8FC-4616-A991-E51E17600797}" type="datetimeFigureOut">
               <a:rPr lang="en-US" smtClean="0"/>
-              <a:t>6/1/2021</a:t>
+              <a:t>6/2/2021</a:t>
             </a:fld>
             <a:endParaRPr lang="en-US"/>
           </a:p>
@@ -689,7 +689,7 @@
           <a:p>
             <a:fld id="{D1B78991-D8FC-4616-A991-E51E17600797}" type="datetimeFigureOut">
               <a:rPr lang="en-US" smtClean="0"/>
-              <a:t>6/1/2021</a:t>
+              <a:t>6/2/2021</a:t>
             </a:fld>
             <a:endParaRPr lang="en-US"/>
           </a:p>
@@ -887,7 +887,7 @@
           <a:p>
             <a:fld id="{D1B78991-D8FC-4616-A991-E51E17600797}" type="datetimeFigureOut">
               <a:rPr lang="en-US" smtClean="0"/>
-              <a:t>6/1/2021</a:t>
+              <a:t>6/2/2021</a:t>
             </a:fld>
             <a:endParaRPr lang="en-US"/>
           </a:p>
@@ -1162,7 +1162,7 @@
           <a:p>
             <a:fld id="{D1B78991-D8FC-4616-A991-E51E17600797}" type="datetimeFigureOut">
               <a:rPr lang="en-US" smtClean="0"/>
-              <a:t>6/1/2021</a:t>
+              <a:t>6/2/2021</a:t>
             </a:fld>
             <a:endParaRPr lang="en-US"/>
           </a:p>
@@ -1427,7 +1427,7 @@
           <a:p>
             <a:fld id="{D1B78991-D8FC-4616-A991-E51E17600797}" type="datetimeFigureOut">
               <a:rPr lang="en-US" smtClean="0"/>
-              <a:t>6/1/2021</a:t>
+              <a:t>6/2/2021</a:t>
             </a:fld>
             <a:endParaRPr lang="en-US"/>
           </a:p>
@@ -1839,7 +1839,7 @@
           <a:p>
             <a:fld id="{D1B78991-D8FC-4616-A991-E51E17600797}" type="datetimeFigureOut">
               <a:rPr lang="en-US" smtClean="0"/>
-              <a:t>6/1/2021</a:t>
+              <a:t>6/2/2021</a:t>
             </a:fld>
             <a:endParaRPr lang="en-US"/>
           </a:p>
@@ -1980,7 +1980,7 @@
           <a:p>
             <a:fld id="{D1B78991-D8FC-4616-A991-E51E17600797}" type="datetimeFigureOut">
               <a:rPr lang="en-US" smtClean="0"/>
-              <a:t>6/1/2021</a:t>
+              <a:t>6/2/2021</a:t>
             </a:fld>
             <a:endParaRPr lang="en-US"/>
           </a:p>
@@ -2093,7 +2093,7 @@
           <a:p>
             <a:fld id="{D1B78991-D8FC-4616-A991-E51E17600797}" type="datetimeFigureOut">
               <a:rPr lang="en-US" smtClean="0"/>
-              <a:t>6/1/2021</a:t>
+              <a:t>6/2/2021</a:t>
             </a:fld>
             <a:endParaRPr lang="en-US"/>
           </a:p>
@@ -2404,7 +2404,7 @@
           <a:p>
             <a:fld id="{D1B78991-D8FC-4616-A991-E51E17600797}" type="datetimeFigureOut">
               <a:rPr lang="en-US" smtClean="0"/>
-              <a:t>6/1/2021</a:t>
+              <a:t>6/2/2021</a:t>
             </a:fld>
             <a:endParaRPr lang="en-US"/>
           </a:p>
@@ -2692,7 +2692,7 @@
           <a:p>
             <a:fld id="{D1B78991-D8FC-4616-A991-E51E17600797}" type="datetimeFigureOut">
               <a:rPr lang="en-US" smtClean="0"/>
-              <a:t>6/1/2021</a:t>
+              <a:t>6/2/2021</a:t>
             </a:fld>
             <a:endParaRPr lang="en-US"/>
           </a:p>
@@ -2933,7 +2933,7 @@
           <a:p>
             <a:fld id="{D1B78991-D8FC-4616-A991-E51E17600797}" type="datetimeFigureOut">
               <a:rPr lang="en-US" smtClean="0"/>
-              <a:t>6/1/2021</a:t>
+              <a:t>6/2/2021</a:t>
             </a:fld>
             <a:endParaRPr lang="en-US"/>
           </a:p>
@@ -25576,6 +25576,45 @@
           </a:p>
         </p:txBody>
       </p:sp>
+      <p:cxnSp>
+        <p:nvCxnSpPr>
+          <p:cNvPr id="7" name="Straight Arrow Connector 6">
+            <a:extLst>
+              <a:ext uri="{FF2B5EF4-FFF2-40B4-BE49-F238E27FC236}">
+                <a16:creationId xmlns:a16="http://schemas.microsoft.com/office/drawing/2014/main" id="{D3A38FC4-C736-47D4-ACE1-7709C4D081BB}"/>
+              </a:ext>
+            </a:extLst>
+          </p:cNvPr>
+          <p:cNvCxnSpPr/>
+          <p:nvPr/>
+        </p:nvCxnSpPr>
+        <p:spPr>
+          <a:xfrm>
+            <a:off x="6202973" y="3002573"/>
+            <a:ext cx="0" cy="790199"/>
+          </a:xfrm>
+          <a:prstGeom prst="straightConnector1">
+            <a:avLst/>
+          </a:prstGeom>
+          <a:ln>
+            <a:tailEnd type="triangle"/>
+          </a:ln>
+        </p:spPr>
+        <p:style>
+          <a:lnRef idx="1">
+            <a:schemeClr val="accent1"/>
+          </a:lnRef>
+          <a:fillRef idx="0">
+            <a:schemeClr val="accent1"/>
+          </a:fillRef>
+          <a:effectRef idx="0">
+            <a:schemeClr val="accent1"/>
+          </a:effectRef>
+          <a:fontRef idx="minor">
+            <a:schemeClr val="tx1"/>
+          </a:fontRef>
+        </p:style>
+      </p:cxnSp>
     </p:spTree>
     <p:extLst>
       <p:ext uri="{BB962C8B-B14F-4D97-AF65-F5344CB8AC3E}">
@@ -30730,7 +30769,7 @@
             </a:extLst>
           </p:cNvPr>
           <p:cNvCxnSpPr>
-            <a:stCxn id="20" idx="1"/>
+            <a:cxnSpLocks/>
             <a:endCxn id="26" idx="5"/>
           </p:cNvCxnSpPr>
           <p:nvPr/>
@@ -30738,7 +30777,7 @@
         <p:spPr>
           <a:xfrm flipH="1" flipV="1">
             <a:off x="3461929" y="4065146"/>
-            <a:ext cx="368810" cy="1264173"/>
+            <a:ext cx="376961" cy="1282418"/>
           </a:xfrm>
           <a:prstGeom prst="line">
             <a:avLst/>
@@ -30770,55 +30809,14 @@
           </p:cNvPr>
           <p:cNvCxnSpPr>
             <a:cxnSpLocks/>
-            <a:stCxn id="20" idx="0"/>
             <a:endCxn id="25" idx="3"/>
           </p:cNvCxnSpPr>
           <p:nvPr/>
         </p:nvCxnSpPr>
         <p:spPr>
           <a:xfrm flipV="1">
-            <a:off x="3850418" y="3992549"/>
-            <a:ext cx="360659" cy="1326872"/>
-          </a:xfrm>
-          <a:prstGeom prst="line">
-            <a:avLst/>
-          </a:prstGeom>
-        </p:spPr>
-        <p:style>
-          <a:lnRef idx="1">
-            <a:schemeClr val="accent1"/>
-          </a:lnRef>
-          <a:fillRef idx="0">
-            <a:schemeClr val="accent1"/>
-          </a:fillRef>
-          <a:effectRef idx="0">
-            <a:schemeClr val="accent1"/>
-          </a:effectRef>
-          <a:fontRef idx="minor">
-            <a:schemeClr val="tx1"/>
-          </a:fontRef>
-        </p:style>
-      </p:cxnSp>
-      <p:cxnSp>
-        <p:nvCxnSpPr>
-          <p:cNvPr id="33" name="Straight Connector 32">
-            <a:extLst>
-              <a:ext uri="{FF2B5EF4-FFF2-40B4-BE49-F238E27FC236}">
-                <a16:creationId xmlns:a16="http://schemas.microsoft.com/office/drawing/2014/main" id="{630AAEA2-00D9-4ED2-BD8C-0F9C380EF030}"/>
-              </a:ext>
-            </a:extLst>
-          </p:cNvPr>
-          <p:cNvCxnSpPr>
-            <a:cxnSpLocks/>
-            <a:stCxn id="20" idx="5"/>
-            <a:endCxn id="23" idx="6"/>
-          </p:cNvCxnSpPr>
-          <p:nvPr/>
-        </p:nvCxnSpPr>
-        <p:spPr>
-          <a:xfrm>
-            <a:off x="3870096" y="5377108"/>
-            <a:ext cx="360660" cy="951466"/>
+            <a:off x="3850415" y="3992549"/>
+            <a:ext cx="360662" cy="1384559"/>
           </a:xfrm>
           <a:prstGeom prst="line">
             <a:avLst/>
@@ -30859,46 +30857,6 @@
           <a:xfrm flipH="1">
             <a:off x="3870095" y="5329319"/>
             <a:ext cx="1" cy="967411"/>
-          </a:xfrm>
-          <a:prstGeom prst="line">
-            <a:avLst/>
-          </a:prstGeom>
-        </p:spPr>
-        <p:style>
-          <a:lnRef idx="1">
-            <a:schemeClr val="accent1"/>
-          </a:lnRef>
-          <a:fillRef idx="0">
-            <a:schemeClr val="accent1"/>
-          </a:fillRef>
-          <a:effectRef idx="0">
-            <a:schemeClr val="accent1"/>
-          </a:effectRef>
-          <a:fontRef idx="minor">
-            <a:schemeClr val="tx1"/>
-          </a:fontRef>
-        </p:style>
-      </p:cxnSp>
-      <p:cxnSp>
-        <p:nvCxnSpPr>
-          <p:cNvPr id="35" name="Straight Connector 34">
-            <a:extLst>
-              <a:ext uri="{FF2B5EF4-FFF2-40B4-BE49-F238E27FC236}">
-                <a16:creationId xmlns:a16="http://schemas.microsoft.com/office/drawing/2014/main" id="{C8277F8F-6208-4D6F-B699-0072E8B83429}"/>
-              </a:ext>
-            </a:extLst>
-          </p:cNvPr>
-          <p:cNvCxnSpPr>
-            <a:cxnSpLocks/>
-            <a:stCxn id="20" idx="1"/>
-            <a:endCxn id="21" idx="0"/>
-          </p:cNvCxnSpPr>
-          <p:nvPr/>
-        </p:nvCxnSpPr>
-        <p:spPr>
-          <a:xfrm flipH="1">
-            <a:off x="3414422" y="5329319"/>
-            <a:ext cx="416317" cy="965462"/>
           </a:xfrm>
           <a:prstGeom prst="line">
             <a:avLst/>
@@ -31442,6 +31400,57 @@
               <a:rPr lang="en-US" dirty="0"/>
               <a:t>Reconstructing HD map from OSM, OSM can give us a network. ARGO-Verse HD maps. ML model to convert OSM to HD map?</a:t>
             </a:r>
+          </a:p>
+        </p:txBody>
+      </p:sp>
+      <p:sp>
+        <p:nvSpPr>
+          <p:cNvPr id="4" name="Oval 3">
+            <a:extLst>
+              <a:ext uri="{FF2B5EF4-FFF2-40B4-BE49-F238E27FC236}">
+                <a16:creationId xmlns:a16="http://schemas.microsoft.com/office/drawing/2014/main" id="{4EEA3A4F-82F7-4ED0-B6B3-6A66F5B5D7E2}"/>
+              </a:ext>
+            </a:extLst>
+          </p:cNvPr>
+          <p:cNvSpPr/>
+          <p:nvPr/>
+        </p:nvSpPr>
+        <p:spPr>
+          <a:xfrm>
+            <a:off x="3528955" y="5017585"/>
+            <a:ext cx="619870" cy="659958"/>
+          </a:xfrm>
+          <a:prstGeom prst="ellipse">
+            <a:avLst/>
+          </a:prstGeom>
+          <a:solidFill>
+            <a:schemeClr val="accent2">
+              <a:alpha val="51000"/>
+            </a:schemeClr>
+          </a:solidFill>
+        </p:spPr>
+        <p:style>
+          <a:lnRef idx="2">
+            <a:schemeClr val="accent1">
+              <a:shade val="50000"/>
+            </a:schemeClr>
+          </a:lnRef>
+          <a:fillRef idx="1">
+            <a:schemeClr val="accent1"/>
+          </a:fillRef>
+          <a:effectRef idx="0">
+            <a:schemeClr val="accent1"/>
+          </a:effectRef>
+          <a:fontRef idx="minor">
+            <a:schemeClr val="lt1"/>
+          </a:fontRef>
+        </p:style>
+        <p:txBody>
+          <a:bodyPr rtlCol="0" anchor="ctr"/>
+          <a:lstStyle/>
+          <a:p>
+            <a:pPr algn="ctr"/>
+            <a:endParaRPr lang="en-US"/>
           </a:p>
         </p:txBody>
       </p:sp>

</xml_diff>